<commit_message>
Edit image `4` in `decision-support/task-2`
</commit_message>
<xml_diff>
--- a/3-course-6-semester/decision-support/task-2/draw-2.pptx
+++ b/3-course-6-semester/decision-support/task-2/draw-2.pptx
@@ -104,6 +104,11 @@
       </a:defRPr>
     </a:lvl9pPr>
   </p:defaultTextStyle>
+  <p:extLst>
+    <p:ext uri="{EFAFB233-063F-42B5-8137-9DF3F51BA10A}">
+      <p15:sldGuideLst xmlns:p15="http://schemas.microsoft.com/office/powerpoint/2012/main"/>
+    </p:ext>
+  </p:extLst>
 </p:presentation>
 </file>
 
@@ -256,7 +261,7 @@
           <a:p>
             <a:fld id="{83A23EDF-54D2-4BED-A161-BD3C25EC7F04}" type="datetimeFigureOut">
               <a:rPr lang="en-US" smtClean="0"/>
-              <a:t>3/3/2022</a:t>
+              <a:t>3/4/2022</a:t>
             </a:fld>
             <a:endParaRPr lang="en-US"/>
           </a:p>
@@ -456,7 +461,7 @@
           <a:p>
             <a:fld id="{83A23EDF-54D2-4BED-A161-BD3C25EC7F04}" type="datetimeFigureOut">
               <a:rPr lang="en-US" smtClean="0"/>
-              <a:t>3/3/2022</a:t>
+              <a:t>3/4/2022</a:t>
             </a:fld>
             <a:endParaRPr lang="en-US"/>
           </a:p>
@@ -666,7 +671,7 @@
           <a:p>
             <a:fld id="{83A23EDF-54D2-4BED-A161-BD3C25EC7F04}" type="datetimeFigureOut">
               <a:rPr lang="en-US" smtClean="0"/>
-              <a:t>3/3/2022</a:t>
+              <a:t>3/4/2022</a:t>
             </a:fld>
             <a:endParaRPr lang="en-US"/>
           </a:p>
@@ -866,7 +871,7 @@
           <a:p>
             <a:fld id="{83A23EDF-54D2-4BED-A161-BD3C25EC7F04}" type="datetimeFigureOut">
               <a:rPr lang="en-US" smtClean="0"/>
-              <a:t>3/3/2022</a:t>
+              <a:t>3/4/2022</a:t>
             </a:fld>
             <a:endParaRPr lang="en-US"/>
           </a:p>
@@ -1142,7 +1147,7 @@
           <a:p>
             <a:fld id="{83A23EDF-54D2-4BED-A161-BD3C25EC7F04}" type="datetimeFigureOut">
               <a:rPr lang="en-US" smtClean="0"/>
-              <a:t>3/3/2022</a:t>
+              <a:t>3/4/2022</a:t>
             </a:fld>
             <a:endParaRPr lang="en-US"/>
           </a:p>
@@ -1410,7 +1415,7 @@
           <a:p>
             <a:fld id="{83A23EDF-54D2-4BED-A161-BD3C25EC7F04}" type="datetimeFigureOut">
               <a:rPr lang="en-US" smtClean="0"/>
-              <a:t>3/3/2022</a:t>
+              <a:t>3/4/2022</a:t>
             </a:fld>
             <a:endParaRPr lang="en-US"/>
           </a:p>
@@ -1825,7 +1830,7 @@
           <a:p>
             <a:fld id="{83A23EDF-54D2-4BED-A161-BD3C25EC7F04}" type="datetimeFigureOut">
               <a:rPr lang="en-US" smtClean="0"/>
-              <a:t>3/3/2022</a:t>
+              <a:t>3/4/2022</a:t>
             </a:fld>
             <a:endParaRPr lang="en-US"/>
           </a:p>
@@ -1967,7 +1972,7 @@
           <a:p>
             <a:fld id="{83A23EDF-54D2-4BED-A161-BD3C25EC7F04}" type="datetimeFigureOut">
               <a:rPr lang="en-US" smtClean="0"/>
-              <a:t>3/3/2022</a:t>
+              <a:t>3/4/2022</a:t>
             </a:fld>
             <a:endParaRPr lang="en-US"/>
           </a:p>
@@ -2080,7 +2085,7 @@
           <a:p>
             <a:fld id="{83A23EDF-54D2-4BED-A161-BD3C25EC7F04}" type="datetimeFigureOut">
               <a:rPr lang="en-US" smtClean="0"/>
-              <a:t>3/3/2022</a:t>
+              <a:t>3/4/2022</a:t>
             </a:fld>
             <a:endParaRPr lang="en-US"/>
           </a:p>
@@ -2393,7 +2398,7 @@
           <a:p>
             <a:fld id="{83A23EDF-54D2-4BED-A161-BD3C25EC7F04}" type="datetimeFigureOut">
               <a:rPr lang="en-US" smtClean="0"/>
-              <a:t>3/3/2022</a:t>
+              <a:t>3/4/2022</a:t>
             </a:fld>
             <a:endParaRPr lang="en-US"/>
           </a:p>
@@ -2682,7 +2687,7 @@
           <a:p>
             <a:fld id="{83A23EDF-54D2-4BED-A161-BD3C25EC7F04}" type="datetimeFigureOut">
               <a:rPr lang="en-US" smtClean="0"/>
-              <a:t>3/3/2022</a:t>
+              <a:t>3/4/2022</a:t>
             </a:fld>
             <a:endParaRPr lang="en-US"/>
           </a:p>
@@ -2925,7 +2930,7 @@
           <a:p>
             <a:fld id="{83A23EDF-54D2-4BED-A161-BD3C25EC7F04}" type="datetimeFigureOut">
               <a:rPr lang="en-US" smtClean="0"/>
-              <a:t>3/3/2022</a:t>
+              <a:t>3/4/2022</a:t>
             </a:fld>
             <a:endParaRPr lang="en-US"/>
           </a:p>
@@ -3398,8 +3403,8 @@
         </p:nvSpPr>
         <p:spPr>
           <a:xfrm>
-            <a:off x="4716421" y="1830930"/>
-            <a:ext cx="2928852" cy="307777"/>
+            <a:off x="4158680" y="1730795"/>
+            <a:ext cx="4142523" cy="307777"/>
           </a:xfrm>
           <a:prstGeom prst="rect">
             <a:avLst/>
@@ -3447,7 +3452,7 @@
                 <a:latin typeface="Times New Roman" panose="02020603050405020304" pitchFamily="18" charset="0"/>
                 <a:cs typeface="Times New Roman" panose="02020603050405020304" pitchFamily="18" charset="0"/>
               </a:rPr>
-              <a:t>, 4, 5, 6, 7, 8, 9, 10, 11, 12}</a:t>
+              <a:t>, 4, 5, 6, 7, 8, 9, 10, 11, 12, 13, 14, 15}</a:t>
             </a:r>
             <a:endParaRPr lang="en-US" sz="1400" dirty="0">
               <a:latin typeface="Times New Roman" panose="02020603050405020304" pitchFamily="18" charset="0"/>
@@ -3593,8 +3598,8 @@
         </p:nvCxnSpPr>
         <p:spPr>
           <a:xfrm flipH="1">
-            <a:off x="3019940" y="2138707"/>
-            <a:ext cx="3160907" cy="202801"/>
+            <a:off x="3019940" y="2038572"/>
+            <a:ext cx="3210002" cy="302936"/>
           </a:xfrm>
           <a:prstGeom prst="straightConnector1">
             <a:avLst/>
@@ -3636,8 +3641,8 @@
         </p:nvCxnSpPr>
         <p:spPr>
           <a:xfrm>
-            <a:off x="6180847" y="2138707"/>
-            <a:ext cx="3587296" cy="195322"/>
+            <a:off x="6229942" y="2038572"/>
+            <a:ext cx="3538201" cy="295457"/>
           </a:xfrm>
           <a:prstGeom prst="straightConnector1">
             <a:avLst/>

</xml_diff>

<commit_message>
Edit `task-2` in `desicion-support`
</commit_message>
<xml_diff>
--- a/3-course-6-semester/decision-support/task-2/draw-2.pptx
+++ b/3-course-6-semester/decision-support/task-2/draw-2.pptx
@@ -6,6 +6,7 @@
   </p:sldMasterIdLst>
   <p:sldIdLst>
     <p:sldId id="256" r:id="rId2"/>
+    <p:sldId id="257" r:id="rId3"/>
   </p:sldIdLst>
   <p:sldSz cx="12192000" cy="6858000"/>
   <p:notesSz cx="6858000" cy="9144000"/>
@@ -261,7 +262,7 @@
           <a:p>
             <a:fld id="{83A23EDF-54D2-4BED-A161-BD3C25EC7F04}" type="datetimeFigureOut">
               <a:rPr lang="en-US" smtClean="0"/>
-              <a:t>3/4/2022</a:t>
+              <a:t>3/17/2022</a:t>
             </a:fld>
             <a:endParaRPr lang="en-US"/>
           </a:p>
@@ -461,7 +462,7 @@
           <a:p>
             <a:fld id="{83A23EDF-54D2-4BED-A161-BD3C25EC7F04}" type="datetimeFigureOut">
               <a:rPr lang="en-US" smtClean="0"/>
-              <a:t>3/4/2022</a:t>
+              <a:t>3/17/2022</a:t>
             </a:fld>
             <a:endParaRPr lang="en-US"/>
           </a:p>
@@ -671,7 +672,7 @@
           <a:p>
             <a:fld id="{83A23EDF-54D2-4BED-A161-BD3C25EC7F04}" type="datetimeFigureOut">
               <a:rPr lang="en-US" smtClean="0"/>
-              <a:t>3/4/2022</a:t>
+              <a:t>3/17/2022</a:t>
             </a:fld>
             <a:endParaRPr lang="en-US"/>
           </a:p>
@@ -871,7 +872,7 @@
           <a:p>
             <a:fld id="{83A23EDF-54D2-4BED-A161-BD3C25EC7F04}" type="datetimeFigureOut">
               <a:rPr lang="en-US" smtClean="0"/>
-              <a:t>3/4/2022</a:t>
+              <a:t>3/17/2022</a:t>
             </a:fld>
             <a:endParaRPr lang="en-US"/>
           </a:p>
@@ -1147,7 +1148,7 @@
           <a:p>
             <a:fld id="{83A23EDF-54D2-4BED-A161-BD3C25EC7F04}" type="datetimeFigureOut">
               <a:rPr lang="en-US" smtClean="0"/>
-              <a:t>3/4/2022</a:t>
+              <a:t>3/17/2022</a:t>
             </a:fld>
             <a:endParaRPr lang="en-US"/>
           </a:p>
@@ -1415,7 +1416,7 @@
           <a:p>
             <a:fld id="{83A23EDF-54D2-4BED-A161-BD3C25EC7F04}" type="datetimeFigureOut">
               <a:rPr lang="en-US" smtClean="0"/>
-              <a:t>3/4/2022</a:t>
+              <a:t>3/17/2022</a:t>
             </a:fld>
             <a:endParaRPr lang="en-US"/>
           </a:p>
@@ -1830,7 +1831,7 @@
           <a:p>
             <a:fld id="{83A23EDF-54D2-4BED-A161-BD3C25EC7F04}" type="datetimeFigureOut">
               <a:rPr lang="en-US" smtClean="0"/>
-              <a:t>3/4/2022</a:t>
+              <a:t>3/17/2022</a:t>
             </a:fld>
             <a:endParaRPr lang="en-US"/>
           </a:p>
@@ -1972,7 +1973,7 @@
           <a:p>
             <a:fld id="{83A23EDF-54D2-4BED-A161-BD3C25EC7F04}" type="datetimeFigureOut">
               <a:rPr lang="en-US" smtClean="0"/>
-              <a:t>3/4/2022</a:t>
+              <a:t>3/17/2022</a:t>
             </a:fld>
             <a:endParaRPr lang="en-US"/>
           </a:p>
@@ -2085,7 +2086,7 @@
           <a:p>
             <a:fld id="{83A23EDF-54D2-4BED-A161-BD3C25EC7F04}" type="datetimeFigureOut">
               <a:rPr lang="en-US" smtClean="0"/>
-              <a:t>3/4/2022</a:t>
+              <a:t>3/17/2022</a:t>
             </a:fld>
             <a:endParaRPr lang="en-US"/>
           </a:p>
@@ -2398,7 +2399,7 @@
           <a:p>
             <a:fld id="{83A23EDF-54D2-4BED-A161-BD3C25EC7F04}" type="datetimeFigureOut">
               <a:rPr lang="en-US" smtClean="0"/>
-              <a:t>3/4/2022</a:t>
+              <a:t>3/17/2022</a:t>
             </a:fld>
             <a:endParaRPr lang="en-US"/>
           </a:p>
@@ -2687,7 +2688,7 @@
           <a:p>
             <a:fld id="{83A23EDF-54D2-4BED-A161-BD3C25EC7F04}" type="datetimeFigureOut">
               <a:rPr lang="en-US" smtClean="0"/>
-              <a:t>3/4/2022</a:t>
+              <a:t>3/17/2022</a:t>
             </a:fld>
             <a:endParaRPr lang="en-US"/>
           </a:p>
@@ -2930,7 +2931,7 @@
           <a:p>
             <a:fld id="{83A23EDF-54D2-4BED-A161-BD3C25EC7F04}" type="datetimeFigureOut">
               <a:rPr lang="en-US" smtClean="0"/>
-              <a:t>3/4/2022</a:t>
+              <a:t>3/17/2022</a:t>
             </a:fld>
             <a:endParaRPr lang="en-US"/>
           </a:p>
@@ -8622,6 +8623,481 @@
 </p:sld>
 </file>
 
+<file path=ppt/slides/slide2.xml><?xml version="1.0" encoding="utf-8"?>
+<p:sld xmlns:a="http://schemas.openxmlformats.org/drawingml/2006/main" xmlns:r="http://schemas.openxmlformats.org/officeDocument/2006/relationships" xmlns:p="http://schemas.openxmlformats.org/presentationml/2006/main">
+  <p:cSld>
+    <p:spTree>
+      <p:nvGrpSpPr>
+        <p:cNvPr id="1" name=""/>
+        <p:cNvGrpSpPr/>
+        <p:nvPr/>
+      </p:nvGrpSpPr>
+      <p:grpSpPr>
+        <a:xfrm>
+          <a:off x="0" y="0"/>
+          <a:ext cx="0" cy="0"/>
+          <a:chOff x="0" y="0"/>
+          <a:chExt cx="0" cy="0"/>
+        </a:xfrm>
+      </p:grpSpPr>
+      <p:pic>
+        <p:nvPicPr>
+          <p:cNvPr id="13" name="Рисунок 12">
+            <a:extLst>
+              <a:ext uri="{FF2B5EF4-FFF2-40B4-BE49-F238E27FC236}">
+                <a16:creationId xmlns:a16="http://schemas.microsoft.com/office/drawing/2014/main" id="{9AA8D257-282B-4557-87E2-87853A371BBA}"/>
+              </a:ext>
+            </a:extLst>
+          </p:cNvPr>
+          <p:cNvPicPr>
+            <a:picLocks noChangeAspect="1"/>
+          </p:cNvPicPr>
+          <p:nvPr/>
+        </p:nvPicPr>
+        <p:blipFill>
+          <a:blip r:embed="rId2"/>
+          <a:stretch>
+            <a:fillRect/>
+          </a:stretch>
+        </p:blipFill>
+        <p:spPr>
+          <a:xfrm>
+            <a:off x="2544801" y="651920"/>
+            <a:ext cx="7102397" cy="3288312"/>
+          </a:xfrm>
+          <a:prstGeom prst="rect">
+            <a:avLst/>
+          </a:prstGeom>
+        </p:spPr>
+      </p:pic>
+      <p:cxnSp>
+        <p:nvCxnSpPr>
+          <p:cNvPr id="15" name="Прямая соединительная линия 14">
+            <a:extLst>
+              <a:ext uri="{FF2B5EF4-FFF2-40B4-BE49-F238E27FC236}">
+                <a16:creationId xmlns:a16="http://schemas.microsoft.com/office/drawing/2014/main" id="{FEF1EA52-2B40-4942-A337-2A62C2157F47}"/>
+              </a:ext>
+            </a:extLst>
+          </p:cNvPr>
+          <p:cNvCxnSpPr/>
+          <p:nvPr/>
+        </p:nvCxnSpPr>
+        <p:spPr>
+          <a:xfrm>
+            <a:off x="1902228" y="1845426"/>
+            <a:ext cx="8387542" cy="0"/>
+          </a:xfrm>
+          <a:prstGeom prst="line">
+            <a:avLst/>
+          </a:prstGeom>
+          <a:ln w="12700">
+            <a:prstDash val="lgDash"/>
+          </a:ln>
+        </p:spPr>
+        <p:style>
+          <a:lnRef idx="1">
+            <a:schemeClr val="accent1"/>
+          </a:lnRef>
+          <a:fillRef idx="0">
+            <a:schemeClr val="accent1"/>
+          </a:fillRef>
+          <a:effectRef idx="0">
+            <a:schemeClr val="accent1"/>
+          </a:effectRef>
+          <a:fontRef idx="minor">
+            <a:schemeClr val="tx1"/>
+          </a:fontRef>
+        </p:style>
+      </p:cxnSp>
+      <p:cxnSp>
+        <p:nvCxnSpPr>
+          <p:cNvPr id="18" name="Прямая соединительная линия 17">
+            <a:extLst>
+              <a:ext uri="{FF2B5EF4-FFF2-40B4-BE49-F238E27FC236}">
+                <a16:creationId xmlns:a16="http://schemas.microsoft.com/office/drawing/2014/main" id="{6B0AF826-9512-4022-836F-4846AED16449}"/>
+              </a:ext>
+            </a:extLst>
+          </p:cNvPr>
+          <p:cNvCxnSpPr/>
+          <p:nvPr/>
+        </p:nvCxnSpPr>
+        <p:spPr>
+          <a:xfrm>
+            <a:off x="1902228" y="900546"/>
+            <a:ext cx="8387542" cy="0"/>
+          </a:xfrm>
+          <a:prstGeom prst="line">
+            <a:avLst/>
+          </a:prstGeom>
+          <a:ln w="12700">
+            <a:prstDash val="lgDash"/>
+          </a:ln>
+        </p:spPr>
+        <p:style>
+          <a:lnRef idx="1">
+            <a:schemeClr val="accent1"/>
+          </a:lnRef>
+          <a:fillRef idx="0">
+            <a:schemeClr val="accent1"/>
+          </a:fillRef>
+          <a:effectRef idx="0">
+            <a:schemeClr val="accent1"/>
+          </a:effectRef>
+          <a:fontRef idx="minor">
+            <a:schemeClr val="tx1"/>
+          </a:fontRef>
+        </p:style>
+      </p:cxnSp>
+      <p:cxnSp>
+        <p:nvCxnSpPr>
+          <p:cNvPr id="19" name="Прямая соединительная линия 18">
+            <a:extLst>
+              <a:ext uri="{FF2B5EF4-FFF2-40B4-BE49-F238E27FC236}">
+                <a16:creationId xmlns:a16="http://schemas.microsoft.com/office/drawing/2014/main" id="{6EACB719-1896-46F9-B909-A066F6091955}"/>
+              </a:ext>
+            </a:extLst>
+          </p:cNvPr>
+          <p:cNvCxnSpPr/>
+          <p:nvPr/>
+        </p:nvCxnSpPr>
+        <p:spPr>
+          <a:xfrm>
+            <a:off x="1902228" y="2798618"/>
+            <a:ext cx="8387542" cy="0"/>
+          </a:xfrm>
+          <a:prstGeom prst="line">
+            <a:avLst/>
+          </a:prstGeom>
+          <a:ln w="12700">
+            <a:prstDash val="lgDash"/>
+          </a:ln>
+        </p:spPr>
+        <p:style>
+          <a:lnRef idx="1">
+            <a:schemeClr val="accent1"/>
+          </a:lnRef>
+          <a:fillRef idx="0">
+            <a:schemeClr val="accent1"/>
+          </a:fillRef>
+          <a:effectRef idx="0">
+            <a:schemeClr val="accent1"/>
+          </a:effectRef>
+          <a:fontRef idx="minor">
+            <a:schemeClr val="tx1"/>
+          </a:fontRef>
+        </p:style>
+      </p:cxnSp>
+      <p:cxnSp>
+        <p:nvCxnSpPr>
+          <p:cNvPr id="20" name="Прямая соединительная линия 19">
+            <a:extLst>
+              <a:ext uri="{FF2B5EF4-FFF2-40B4-BE49-F238E27FC236}">
+                <a16:creationId xmlns:a16="http://schemas.microsoft.com/office/drawing/2014/main" id="{6FB279F8-742F-41AF-B1AE-F08A5D570636}"/>
+              </a:ext>
+            </a:extLst>
+          </p:cNvPr>
+          <p:cNvCxnSpPr/>
+          <p:nvPr/>
+        </p:nvCxnSpPr>
+        <p:spPr>
+          <a:xfrm>
+            <a:off x="1902228" y="3757353"/>
+            <a:ext cx="8387542" cy="0"/>
+          </a:xfrm>
+          <a:prstGeom prst="line">
+            <a:avLst/>
+          </a:prstGeom>
+          <a:ln w="12700">
+            <a:prstDash val="lgDash"/>
+          </a:ln>
+        </p:spPr>
+        <p:style>
+          <a:lnRef idx="1">
+            <a:schemeClr val="accent1"/>
+          </a:lnRef>
+          <a:fillRef idx="0">
+            <a:schemeClr val="accent1"/>
+          </a:fillRef>
+          <a:effectRef idx="0">
+            <a:schemeClr val="accent1"/>
+          </a:effectRef>
+          <a:fontRef idx="minor">
+            <a:schemeClr val="tx1"/>
+          </a:fontRef>
+        </p:style>
+      </p:cxnSp>
+      <p:pic>
+        <p:nvPicPr>
+          <p:cNvPr id="22" name="Рисунок 21">
+            <a:extLst>
+              <a:ext uri="{FF2B5EF4-FFF2-40B4-BE49-F238E27FC236}">
+                <a16:creationId xmlns:a16="http://schemas.microsoft.com/office/drawing/2014/main" id="{56E22FF5-DEAB-4CF9-B8E8-97C1ABBAF483}"/>
+              </a:ext>
+            </a:extLst>
+          </p:cNvPr>
+          <p:cNvPicPr>
+            <a:picLocks noChangeAspect="1"/>
+          </p:cNvPicPr>
+          <p:nvPr/>
+        </p:nvPicPr>
+        <p:blipFill>
+          <a:blip r:embed="rId3"/>
+          <a:stretch>
+            <a:fillRect/>
+          </a:stretch>
+        </p:blipFill>
+        <p:spPr>
+          <a:xfrm>
+            <a:off x="2544801" y="4315982"/>
+            <a:ext cx="6697010" cy="400106"/>
+          </a:xfrm>
+          <a:prstGeom prst="rect">
+            <a:avLst/>
+          </a:prstGeom>
+        </p:spPr>
+      </p:pic>
+      <p:cxnSp>
+        <p:nvCxnSpPr>
+          <p:cNvPr id="23" name="Прямая соединительная линия 22">
+            <a:extLst>
+              <a:ext uri="{FF2B5EF4-FFF2-40B4-BE49-F238E27FC236}">
+                <a16:creationId xmlns:a16="http://schemas.microsoft.com/office/drawing/2014/main" id="{D26ACE3C-8A91-4C7C-B68D-2CE3DC16099F}"/>
+              </a:ext>
+            </a:extLst>
+          </p:cNvPr>
+          <p:cNvCxnSpPr/>
+          <p:nvPr/>
+        </p:nvCxnSpPr>
+        <p:spPr>
+          <a:xfrm>
+            <a:off x="1902228" y="4527119"/>
+            <a:ext cx="8387542" cy="0"/>
+          </a:xfrm>
+          <a:prstGeom prst="line">
+            <a:avLst/>
+          </a:prstGeom>
+          <a:ln w="12700">
+            <a:prstDash val="lgDash"/>
+          </a:ln>
+        </p:spPr>
+        <p:style>
+          <a:lnRef idx="1">
+            <a:schemeClr val="accent1"/>
+          </a:lnRef>
+          <a:fillRef idx="0">
+            <a:schemeClr val="accent1"/>
+          </a:fillRef>
+          <a:effectRef idx="0">
+            <a:schemeClr val="accent1"/>
+          </a:effectRef>
+          <a:fontRef idx="minor">
+            <a:schemeClr val="tx1"/>
+          </a:fontRef>
+        </p:style>
+      </p:cxnSp>
+      <p:sp>
+        <p:nvSpPr>
+          <p:cNvPr id="24" name="TextBox 23">
+            <a:extLst>
+              <a:ext uri="{FF2B5EF4-FFF2-40B4-BE49-F238E27FC236}">
+                <a16:creationId xmlns:a16="http://schemas.microsoft.com/office/drawing/2014/main" id="{C2DE3B66-93CB-4AEC-A138-43A81226E9DD}"/>
+              </a:ext>
+            </a:extLst>
+          </p:cNvPr>
+          <p:cNvSpPr txBox="1"/>
+          <p:nvPr/>
+        </p:nvSpPr>
+        <p:spPr>
+          <a:xfrm>
+            <a:off x="1652846" y="691907"/>
+            <a:ext cx="249382" cy="276999"/>
+          </a:xfrm>
+          <a:prstGeom prst="rect">
+            <a:avLst/>
+          </a:prstGeom>
+          <a:noFill/>
+        </p:spPr>
+        <p:txBody>
+          <a:bodyPr wrap="square" rtlCol="0">
+            <a:spAutoFit/>
+          </a:bodyPr>
+          <a:lstStyle/>
+          <a:p>
+            <a:r>
+              <a:rPr lang="en-US" sz="1200" dirty="0">
+                <a:latin typeface="Times New Roman" panose="02020603050405020304" pitchFamily="18" charset="0"/>
+                <a:cs typeface="Times New Roman" panose="02020603050405020304" pitchFamily="18" charset="0"/>
+              </a:rPr>
+              <a:t>1</a:t>
+            </a:r>
+          </a:p>
+        </p:txBody>
+      </p:sp>
+      <p:sp>
+        <p:nvSpPr>
+          <p:cNvPr id="25" name="TextBox 24">
+            <a:extLst>
+              <a:ext uri="{FF2B5EF4-FFF2-40B4-BE49-F238E27FC236}">
+                <a16:creationId xmlns:a16="http://schemas.microsoft.com/office/drawing/2014/main" id="{43D0486A-C57B-4D7E-9E60-C00B786E698D}"/>
+              </a:ext>
+            </a:extLst>
+          </p:cNvPr>
+          <p:cNvSpPr txBox="1"/>
+          <p:nvPr/>
+        </p:nvSpPr>
+        <p:spPr>
+          <a:xfrm>
+            <a:off x="1652846" y="1632179"/>
+            <a:ext cx="249382" cy="276999"/>
+          </a:xfrm>
+          <a:prstGeom prst="rect">
+            <a:avLst/>
+          </a:prstGeom>
+          <a:noFill/>
+        </p:spPr>
+        <p:txBody>
+          <a:bodyPr wrap="square" rtlCol="0">
+            <a:spAutoFit/>
+          </a:bodyPr>
+          <a:lstStyle/>
+          <a:p>
+            <a:r>
+              <a:rPr lang="en-US" sz="1200" dirty="0">
+                <a:latin typeface="Times New Roman" panose="02020603050405020304" pitchFamily="18" charset="0"/>
+                <a:cs typeface="Times New Roman" panose="02020603050405020304" pitchFamily="18" charset="0"/>
+              </a:rPr>
+              <a:t>2</a:t>
+            </a:r>
+          </a:p>
+        </p:txBody>
+      </p:sp>
+      <p:sp>
+        <p:nvSpPr>
+          <p:cNvPr id="26" name="TextBox 25">
+            <a:extLst>
+              <a:ext uri="{FF2B5EF4-FFF2-40B4-BE49-F238E27FC236}">
+                <a16:creationId xmlns:a16="http://schemas.microsoft.com/office/drawing/2014/main" id="{6B655666-F9A9-43F6-8CF5-E04CB93F7AF6}"/>
+              </a:ext>
+            </a:extLst>
+          </p:cNvPr>
+          <p:cNvSpPr txBox="1"/>
+          <p:nvPr/>
+        </p:nvSpPr>
+        <p:spPr>
+          <a:xfrm>
+            <a:off x="1652846" y="2564720"/>
+            <a:ext cx="249382" cy="276999"/>
+          </a:xfrm>
+          <a:prstGeom prst="rect">
+            <a:avLst/>
+          </a:prstGeom>
+          <a:noFill/>
+        </p:spPr>
+        <p:txBody>
+          <a:bodyPr wrap="square" rtlCol="0">
+            <a:spAutoFit/>
+          </a:bodyPr>
+          <a:lstStyle/>
+          <a:p>
+            <a:r>
+              <a:rPr lang="en-US" sz="1200" dirty="0">
+                <a:latin typeface="Times New Roman" panose="02020603050405020304" pitchFamily="18" charset="0"/>
+                <a:cs typeface="Times New Roman" panose="02020603050405020304" pitchFamily="18" charset="0"/>
+              </a:rPr>
+              <a:t>3</a:t>
+            </a:r>
+          </a:p>
+        </p:txBody>
+      </p:sp>
+      <p:sp>
+        <p:nvSpPr>
+          <p:cNvPr id="27" name="TextBox 26">
+            <a:extLst>
+              <a:ext uri="{FF2B5EF4-FFF2-40B4-BE49-F238E27FC236}">
+                <a16:creationId xmlns:a16="http://schemas.microsoft.com/office/drawing/2014/main" id="{139B5778-A3E4-4F89-B7D6-693E9955A20E}"/>
+              </a:ext>
+            </a:extLst>
+          </p:cNvPr>
+          <p:cNvSpPr txBox="1"/>
+          <p:nvPr/>
+        </p:nvSpPr>
+        <p:spPr>
+          <a:xfrm>
+            <a:off x="1652846" y="3472984"/>
+            <a:ext cx="249382" cy="276999"/>
+          </a:xfrm>
+          <a:prstGeom prst="rect">
+            <a:avLst/>
+          </a:prstGeom>
+          <a:noFill/>
+        </p:spPr>
+        <p:txBody>
+          <a:bodyPr wrap="square" rtlCol="0">
+            <a:spAutoFit/>
+          </a:bodyPr>
+          <a:lstStyle/>
+          <a:p>
+            <a:r>
+              <a:rPr lang="en-US" sz="1200" dirty="0">
+                <a:latin typeface="Times New Roman" panose="02020603050405020304" pitchFamily="18" charset="0"/>
+                <a:cs typeface="Times New Roman" panose="02020603050405020304" pitchFamily="18" charset="0"/>
+              </a:rPr>
+              <a:t>4</a:t>
+            </a:r>
+          </a:p>
+        </p:txBody>
+      </p:sp>
+      <p:sp>
+        <p:nvSpPr>
+          <p:cNvPr id="28" name="TextBox 27">
+            <a:extLst>
+              <a:ext uri="{FF2B5EF4-FFF2-40B4-BE49-F238E27FC236}">
+                <a16:creationId xmlns:a16="http://schemas.microsoft.com/office/drawing/2014/main" id="{1814EFB3-A6D6-40DA-8812-7733EF09C9C4}"/>
+              </a:ext>
+            </a:extLst>
+          </p:cNvPr>
+          <p:cNvSpPr txBox="1"/>
+          <p:nvPr/>
+        </p:nvSpPr>
+        <p:spPr>
+          <a:xfrm>
+            <a:off x="1652846" y="4250120"/>
+            <a:ext cx="249382" cy="276999"/>
+          </a:xfrm>
+          <a:prstGeom prst="rect">
+            <a:avLst/>
+          </a:prstGeom>
+          <a:noFill/>
+        </p:spPr>
+        <p:txBody>
+          <a:bodyPr wrap="square" rtlCol="0">
+            <a:spAutoFit/>
+          </a:bodyPr>
+          <a:lstStyle/>
+          <a:p>
+            <a:r>
+              <a:rPr lang="en-US" sz="1200" dirty="0">
+                <a:latin typeface="Times New Roman" panose="02020603050405020304" pitchFamily="18" charset="0"/>
+                <a:cs typeface="Times New Roman" panose="02020603050405020304" pitchFamily="18" charset="0"/>
+              </a:rPr>
+              <a:t>5</a:t>
+            </a:r>
+          </a:p>
+        </p:txBody>
+      </p:sp>
+    </p:spTree>
+    <p:extLst>
+      <p:ext uri="{BB962C8B-B14F-4D97-AF65-F5344CB8AC3E}">
+        <p14:creationId xmlns:p14="http://schemas.microsoft.com/office/powerpoint/2010/main" val="3044703194"/>
+      </p:ext>
+    </p:extLst>
+  </p:cSld>
+  <p:clrMapOvr>
+    <a:masterClrMapping/>
+  </p:clrMapOvr>
+</p:sld>
+</file>
+
 <file path=ppt/theme/theme1.xml><?xml version="1.0" encoding="utf-8"?>
 <a:theme xmlns:a="http://schemas.openxmlformats.org/drawingml/2006/main" name="Тема Office">
   <a:themeElements>

</xml_diff>